<commit_message>
Simulated monthly leg data, comparison plots
</commit_message>
<xml_diff>
--- a/Poster.pptx
+++ b/Poster.pptx
@@ -104,6 +104,11 @@
       </a:defRPr>
     </a:lvl9pPr>
   </p:defaultTextStyle>
+  <p:extLst>
+    <p:ext uri="{EFAFB233-063F-42B5-8137-9DF3F51BA10A}">
+      <p15:sldGuideLst xmlns:p15="http://schemas.microsoft.com/office/powerpoint/2012/main"/>
+    </p:ext>
+  </p:extLst>
 </p:presentation>
 </file>
 
@@ -3004,7 +3009,9 @@
               <a:rPr lang="en-US" sz="8000" dirty="0" smtClean="0">
                 <a:ln w="0"/>
                 <a:solidFill>
-                  <a:schemeClr val="accent1"/>
+                  <a:schemeClr val="accent6">
+                    <a:lumMod val="50000"/>
+                  </a:schemeClr>
                 </a:solidFill>
                 <a:effectLst>
                   <a:outerShdw blurRad="38100" dist="25400" dir="5400000" algn="ctr" rotWithShape="0">
@@ -3017,10 +3024,12 @@
               <a:t>‘</a:t>
             </a:r>
             <a:r>
-              <a:rPr lang="en-US" sz="8000" dirty="0" err="1" smtClean="0">
+              <a:rPr lang="en-US" sz="8000" b="1" dirty="0" err="1" smtClean="0">
                 <a:ln w="0"/>
                 <a:solidFill>
-                  <a:schemeClr val="accent1"/>
+                  <a:schemeClr val="accent6">
+                    <a:lumMod val="50000"/>
+                  </a:schemeClr>
                 </a:solidFill>
                 <a:effectLst>
                   <a:outerShdw blurRad="38100" dist="25400" dir="5400000" algn="ctr" rotWithShape="0">
@@ -3033,10 +3042,12 @@
               <a:t>eesim</a:t>
             </a:r>
             <a:r>
-              <a:rPr lang="en-US" sz="8000" dirty="0" smtClean="0">
+              <a:rPr lang="en-US" sz="8000" b="1" dirty="0" smtClean="0">
                 <a:ln w="0"/>
                 <a:solidFill>
-                  <a:schemeClr val="accent1"/>
+                  <a:schemeClr val="accent6">
+                    <a:lumMod val="50000"/>
+                  </a:schemeClr>
                 </a:solidFill>
                 <a:effectLst>
                   <a:outerShdw blurRad="38100" dist="25400" dir="5400000" algn="ctr" rotWithShape="0">
@@ -3046,28 +3057,14 @@
                   </a:outerShdw>
                 </a:effectLst>
               </a:rPr>
-              <a:t>’: The World’s Greatest Epidemiological Data </a:t>
-            </a:r>
-            <a:r>
-              <a:rPr lang="en-US" sz="8000" smtClean="0">
-                <a:ln w="0"/>
-                <a:solidFill>
-                  <a:schemeClr val="accent1"/>
-                </a:solidFill>
-                <a:effectLst>
-                  <a:outerShdw blurRad="38100" dist="25400" dir="5400000" algn="ctr" rotWithShape="0">
-                    <a:srgbClr val="6E747A">
-                      <a:alpha val="43000"/>
-                    </a:srgbClr>
-                  </a:outerShdw>
-                </a:effectLst>
-              </a:rPr>
-              <a:t>Simulation Software</a:t>
-            </a:r>
-            <a:endParaRPr lang="en-US" sz="8000" dirty="0">
+              <a:t>’: The World’s Greatest Epidemiological Data Simulation Software</a:t>
+            </a:r>
+            <a:endParaRPr lang="en-US" sz="8000" b="1" dirty="0">
               <a:ln w="0"/>
               <a:solidFill>
-                <a:schemeClr val="accent1"/>
+                <a:schemeClr val="accent6">
+                  <a:lumMod val="50000"/>
+                </a:schemeClr>
               </a:solidFill>
               <a:effectLst>
                 <a:outerShdw blurRad="38100" dist="25400" dir="5400000" algn="ctr" rotWithShape="0">
@@ -3076,6 +3073,296 @@
                   </a:srgbClr>
                 </a:outerShdw>
               </a:effectLst>
+            </a:endParaRPr>
+          </a:p>
+        </p:txBody>
+      </p:sp>
+      <p:pic>
+        <p:nvPicPr>
+          <p:cNvPr id="2" name="Picture 1"/>
+          <p:cNvPicPr>
+            <a:picLocks noChangeAspect="1"/>
+          </p:cNvPicPr>
+          <p:nvPr/>
+        </p:nvPicPr>
+        <p:blipFill>
+          <a:blip r:embed="rId2" cstate="print">
+            <a:extLst>
+              <a:ext uri="{28A0092B-C50C-407E-A947-70E740481C1C}">
+                <a14:useLocalDpi xmlns:a14="http://schemas.microsoft.com/office/drawing/2010/main" val="0"/>
+              </a:ext>
+            </a:extLst>
+          </a:blip>
+          <a:stretch>
+            <a:fillRect/>
+          </a:stretch>
+        </p:blipFill>
+        <p:spPr>
+          <a:xfrm>
+            <a:off x="1469572" y="522513"/>
+            <a:ext cx="2645230" cy="2645230"/>
+          </a:xfrm>
+          <a:prstGeom prst="rect">
+            <a:avLst/>
+          </a:prstGeom>
+        </p:spPr>
+      </p:pic>
+      <p:pic>
+        <p:nvPicPr>
+          <p:cNvPr id="4" name="Picture 3"/>
+          <p:cNvPicPr>
+            <a:picLocks noChangeAspect="1"/>
+          </p:cNvPicPr>
+          <p:nvPr/>
+        </p:nvPicPr>
+        <p:blipFill>
+          <a:blip r:embed="rId2" cstate="print">
+            <a:extLst>
+              <a:ext uri="{28A0092B-C50C-407E-A947-70E740481C1C}">
+                <a14:useLocalDpi xmlns:a14="http://schemas.microsoft.com/office/drawing/2010/main" val="0"/>
+              </a:ext>
+            </a:extLst>
+          </a:blip>
+          <a:stretch>
+            <a:fillRect/>
+          </a:stretch>
+        </p:blipFill>
+        <p:spPr>
+          <a:xfrm>
+            <a:off x="34409743" y="522513"/>
+            <a:ext cx="2645230" cy="2645230"/>
+          </a:xfrm>
+          <a:prstGeom prst="rect">
+            <a:avLst/>
+          </a:prstGeom>
+        </p:spPr>
+      </p:pic>
+      <p:sp>
+        <p:nvSpPr>
+          <p:cNvPr id="3" name="Rounded Rectangle 2"/>
+          <p:cNvSpPr/>
+          <p:nvPr/>
+        </p:nvSpPr>
+        <p:spPr>
+          <a:xfrm>
+            <a:off x="1110343" y="4572001"/>
+            <a:ext cx="9241972" cy="7315200"/>
+          </a:xfrm>
+          <a:prstGeom prst="roundRect">
+            <a:avLst/>
+          </a:prstGeom>
+        </p:spPr>
+        <p:style>
+          <a:lnRef idx="2">
+            <a:schemeClr val="accent6"/>
+          </a:lnRef>
+          <a:fillRef idx="1">
+            <a:schemeClr val="lt1"/>
+          </a:fillRef>
+          <a:effectRef idx="0">
+            <a:schemeClr val="accent6"/>
+          </a:effectRef>
+          <a:fontRef idx="minor">
+            <a:schemeClr val="dk1"/>
+          </a:fontRef>
+        </p:style>
+        <p:txBody>
+          <a:bodyPr rtlCol="0" anchor="ctr"/>
+          <a:lstStyle/>
+          <a:p>
+            <a:pPr algn="ctr"/>
+            <a:r>
+              <a:rPr lang="en-US" b="1" dirty="0" smtClean="0">
+                <a:solidFill>
+                  <a:schemeClr val="accent6">
+                    <a:lumMod val="50000"/>
+                  </a:schemeClr>
+                </a:solidFill>
+              </a:rPr>
+              <a:t>Introduction</a:t>
+            </a:r>
+          </a:p>
+          <a:p>
+            <a:r>
+              <a:rPr lang="en-US" sz="3600" dirty="0" smtClean="0">
+                <a:solidFill>
+                  <a:schemeClr val="accent6">
+                    <a:lumMod val="50000"/>
+                  </a:schemeClr>
+                </a:solidFill>
+              </a:rPr>
+              <a:t>‘</a:t>
+            </a:r>
+            <a:r>
+              <a:rPr lang="en-US" sz="3600" dirty="0" err="1" smtClean="0">
+                <a:solidFill>
+                  <a:schemeClr val="accent6">
+                    <a:lumMod val="50000"/>
+                  </a:schemeClr>
+                </a:solidFill>
+              </a:rPr>
+              <a:t>eesim</a:t>
+            </a:r>
+            <a:r>
+              <a:rPr lang="en-US" sz="3600" dirty="0" smtClean="0">
+                <a:solidFill>
+                  <a:schemeClr val="accent6">
+                    <a:lumMod val="50000"/>
+                  </a:schemeClr>
+                </a:solidFill>
+              </a:rPr>
+              <a:t>’ is an R package which provides </a:t>
+            </a:r>
+            <a:r>
+              <a:rPr lang="en-US" sz="3600" dirty="0">
+                <a:solidFill>
+                  <a:schemeClr val="accent6">
+                    <a:lumMod val="50000"/>
+                  </a:schemeClr>
+                </a:solidFill>
+              </a:rPr>
+              <a:t>functions to create simulated time series of </a:t>
+            </a:r>
+            <a:r>
+              <a:rPr lang="en-US" sz="3600" dirty="0" smtClean="0">
+                <a:solidFill>
+                  <a:schemeClr val="accent6">
+                    <a:lumMod val="50000"/>
+                  </a:schemeClr>
+                </a:solidFill>
+              </a:rPr>
+              <a:t>environmental exposures </a:t>
+            </a:r>
+            <a:r>
+              <a:rPr lang="en-US" sz="3600" dirty="0">
+                <a:solidFill>
+                  <a:schemeClr val="accent6">
+                    <a:lumMod val="50000"/>
+                  </a:schemeClr>
+                </a:solidFill>
+              </a:rPr>
+              <a:t>(e.g., temperature, air pollution) and health outcomes for use </a:t>
+            </a:r>
+            <a:r>
+              <a:rPr lang="en-US" sz="3600" dirty="0" smtClean="0">
+                <a:solidFill>
+                  <a:schemeClr val="accent6">
+                    <a:lumMod val="50000"/>
+                  </a:schemeClr>
+                </a:solidFill>
+              </a:rPr>
+              <a:t>in power </a:t>
+            </a:r>
+            <a:r>
+              <a:rPr lang="en-US" sz="3600" dirty="0">
+                <a:solidFill>
+                  <a:schemeClr val="accent6">
+                    <a:lumMod val="50000"/>
+                  </a:schemeClr>
+                </a:solidFill>
+              </a:rPr>
+              <a:t>analysis and simulation studies in environmental epidemiology. </a:t>
+            </a:r>
+            <a:r>
+              <a:rPr lang="en-US" sz="3600" dirty="0" smtClean="0">
+                <a:solidFill>
+                  <a:schemeClr val="accent6">
+                    <a:lumMod val="50000"/>
+                  </a:schemeClr>
+                </a:solidFill>
+              </a:rPr>
+              <a:t>This package </a:t>
+            </a:r>
+            <a:r>
+              <a:rPr lang="en-US" sz="3600" dirty="0">
+                <a:solidFill>
+                  <a:schemeClr val="accent6">
+                    <a:lumMod val="50000"/>
+                  </a:schemeClr>
+                </a:solidFill>
+              </a:rPr>
+              <a:t>also provides functions to evaluate the results of simulation </a:t>
+            </a:r>
+            <a:r>
+              <a:rPr lang="en-US" sz="3600" dirty="0" smtClean="0">
+                <a:solidFill>
+                  <a:schemeClr val="accent6">
+                    <a:lumMod val="50000"/>
+                  </a:schemeClr>
+                </a:solidFill>
+              </a:rPr>
+              <a:t>studies based </a:t>
+            </a:r>
+            <a:r>
+              <a:rPr lang="en-US" sz="3600" dirty="0">
+                <a:solidFill>
+                  <a:schemeClr val="accent6">
+                    <a:lumMod val="50000"/>
+                  </a:schemeClr>
+                </a:solidFill>
+              </a:rPr>
+              <a:t>on these simulated time series.</a:t>
+            </a:r>
+            <a:endParaRPr lang="en-US" sz="3600" dirty="0" smtClean="0">
+              <a:solidFill>
+                <a:schemeClr val="accent6">
+                  <a:lumMod val="50000"/>
+                </a:schemeClr>
+              </a:solidFill>
+            </a:endParaRPr>
+          </a:p>
+        </p:txBody>
+      </p:sp>
+      <p:sp>
+        <p:nvSpPr>
+          <p:cNvPr id="8" name="Rounded Rectangle 7"/>
+          <p:cNvSpPr/>
+          <p:nvPr/>
+        </p:nvSpPr>
+        <p:spPr>
+          <a:xfrm>
+            <a:off x="1110343" y="12409717"/>
+            <a:ext cx="9241972" cy="24982712"/>
+          </a:xfrm>
+          <a:prstGeom prst="roundRect">
+            <a:avLst/>
+          </a:prstGeom>
+        </p:spPr>
+        <p:style>
+          <a:lnRef idx="2">
+            <a:schemeClr val="accent6"/>
+          </a:lnRef>
+          <a:fillRef idx="1">
+            <a:schemeClr val="lt1"/>
+          </a:fillRef>
+          <a:effectRef idx="0">
+            <a:schemeClr val="accent6"/>
+          </a:effectRef>
+          <a:fontRef idx="minor">
+            <a:schemeClr val="dk1"/>
+          </a:fontRef>
+        </p:style>
+        <p:txBody>
+          <a:bodyPr rtlCol="0" anchor="ctr"/>
+          <a:lstStyle/>
+          <a:p>
+            <a:pPr algn="ctr"/>
+            <a:r>
+              <a:rPr lang="en-US" b="1" dirty="0" smtClean="0">
+                <a:solidFill>
+                  <a:schemeClr val="accent6">
+                    <a:lumMod val="50000"/>
+                  </a:schemeClr>
+                </a:solidFill>
+              </a:rPr>
+              <a:t>Motivation</a:t>
+            </a:r>
+            <a:endParaRPr lang="en-US" b="1" dirty="0">
+              <a:solidFill>
+                <a:schemeClr val="accent6">
+                  <a:lumMod val="50000"/>
+                </a:schemeClr>
+              </a:solidFill>
             </a:endParaRPr>
           </a:p>
         </p:txBody>

</xml_diff>

<commit_message>
Change poster text color
</commit_message>
<xml_diff>
--- a/Poster.pptx
+++ b/Poster.pptx
@@ -4205,23 +4205,43 @@
           <a:lstStyle/>
           <a:p>
             <a:r>
-              <a:rPr lang="en-US" sz="5400" b="1" i="1" dirty="0" smtClean="0"/>
+              <a:rPr lang="en-US" sz="5400" b="1" i="1" dirty="0" smtClean="0">
+                <a:solidFill>
+                  <a:schemeClr val="bg1"/>
+                </a:solidFill>
+              </a:rPr>
               <a:t>Sarah Koehler </a:t>
             </a:r>
-            <a:endParaRPr lang="en-US" sz="5400" b="1" i="1" dirty="0"/>
-          </a:p>
-          <a:p>
-            <a:r>
-              <a:rPr lang="en-US" sz="5400" b="1" i="1" dirty="0" smtClean="0"/>
+            <a:endParaRPr lang="en-US" sz="5400" b="1" i="1" dirty="0">
+              <a:solidFill>
+                <a:schemeClr val="bg1"/>
+              </a:solidFill>
+            </a:endParaRPr>
+          </a:p>
+          <a:p>
+            <a:r>
+              <a:rPr lang="en-US" sz="5400" b="1" i="1" dirty="0" smtClean="0">
+                <a:solidFill>
+                  <a:schemeClr val="bg1"/>
+                </a:solidFill>
+              </a:rPr>
               <a:t>Brooke Anderson</a:t>
             </a:r>
           </a:p>
           <a:p>
             <a:r>
-              <a:rPr lang="en-US" sz="5400" i="1" dirty="0" smtClean="0"/>
+              <a:rPr lang="en-US" sz="5400" i="1" dirty="0" smtClean="0">
+                <a:solidFill>
+                  <a:schemeClr val="bg1"/>
+                </a:solidFill>
+              </a:rPr>
               <a:t>Colorado State University</a:t>
             </a:r>
-            <a:endParaRPr lang="en-US" sz="5400" i="1" dirty="0"/>
+            <a:endParaRPr lang="en-US" sz="5400" i="1" dirty="0">
+              <a:solidFill>
+                <a:schemeClr val="bg1"/>
+              </a:solidFill>
+            </a:endParaRPr>
           </a:p>
         </p:txBody>
       </p:sp>
@@ -6114,39 +6134,75 @@
           <a:lstStyle/>
           <a:p>
             <a:r>
-              <a:rPr lang="en-US" sz="3200" i="1" dirty="0"/>
+              <a:rPr lang="en-US" sz="3200" i="1" dirty="0">
+                <a:solidFill>
+                  <a:schemeClr val="bg1"/>
+                </a:solidFill>
+              </a:rPr>
               <a:t>This work was supported by a </a:t>
             </a:r>
             <a:r>
-              <a:rPr lang="en-US" sz="3200" i="1" dirty="0" smtClean="0"/>
+              <a:rPr lang="en-US" sz="3200" i="1" dirty="0" smtClean="0">
+                <a:solidFill>
+                  <a:schemeClr val="bg1"/>
+                </a:solidFill>
+              </a:rPr>
               <a:t>grant from </a:t>
             </a:r>
             <a:r>
-              <a:rPr lang="en-US" sz="3200" i="1" dirty="0"/>
+              <a:rPr lang="en-US" sz="3200" i="1" dirty="0">
+                <a:solidFill>
+                  <a:schemeClr val="bg1"/>
+                </a:solidFill>
+              </a:rPr>
               <a:t>the National Institute of Environmental </a:t>
             </a:r>
             <a:r>
-              <a:rPr lang="en-US" sz="3200" i="1" dirty="0" smtClean="0"/>
+              <a:rPr lang="en-US" sz="3200" i="1" dirty="0" smtClean="0">
+                <a:solidFill>
+                  <a:schemeClr val="bg1"/>
+                </a:solidFill>
+              </a:rPr>
               <a:t>Health Sciences </a:t>
             </a:r>
             <a:r>
-              <a:rPr lang="en-US" sz="3200" i="1" dirty="0"/>
+              <a:rPr lang="en-US" sz="3200" i="1" dirty="0">
+                <a:solidFill>
+                  <a:schemeClr val="bg1"/>
+                </a:solidFill>
+              </a:rPr>
               <a:t>(R00ES022631) </a:t>
             </a:r>
             <a:r>
-              <a:rPr lang="en-US" sz="3200" i="1" dirty="0" smtClean="0"/>
+              <a:rPr lang="en-US" sz="3200" i="1" dirty="0" smtClean="0">
+                <a:solidFill>
+                  <a:schemeClr val="bg1"/>
+                </a:solidFill>
+              </a:rPr>
               <a:t>and a </a:t>
             </a:r>
             <a:r>
-              <a:rPr lang="en-US" sz="3200" i="1" dirty="0"/>
+              <a:rPr lang="en-US" sz="3200" i="1" dirty="0">
+                <a:solidFill>
+                  <a:schemeClr val="bg1"/>
+                </a:solidFill>
+              </a:rPr>
               <a:t>fellowship from the Colorado State University Programs </a:t>
             </a:r>
             <a:r>
-              <a:rPr lang="en-US" sz="3200" i="1" dirty="0" smtClean="0"/>
+              <a:rPr lang="en-US" sz="3200" i="1" dirty="0" smtClean="0">
+                <a:solidFill>
+                  <a:schemeClr val="bg1"/>
+                </a:solidFill>
+              </a:rPr>
               <a:t>for Research and Scholarly </a:t>
             </a:r>
             <a:r>
-              <a:rPr lang="en-US" sz="3200" i="1" dirty="0"/>
+              <a:rPr lang="en-US" sz="3200" i="1" dirty="0">
+                <a:solidFill>
+                  <a:schemeClr val="bg1"/>
+                </a:solidFill>
+              </a:rPr>
               <a:t>Excellence.</a:t>
             </a:r>
           </a:p>

</xml_diff>